<commit_message>
01. Introduction to ASP.NET - added
</commit_message>
<xml_diff>
--- a/ASP.NET Web Forms/01. Introduction to ASP.NET/Introduction-to-ASP.NET.pptx
+++ b/ASP.NET Web Forms/01. Introduction to ASP.NET/Introduction-to-ASP.NET.pptx
@@ -5,10 +5,10 @@
     <p:sldMasterId id="2147483672" r:id="rId1"/>
   </p:sldMasterIdLst>
   <p:notesMasterIdLst>
-    <p:notesMasterId r:id="rId41"/>
+    <p:notesMasterId r:id="rId42"/>
   </p:notesMasterIdLst>
   <p:handoutMasterIdLst>
-    <p:handoutMasterId r:id="rId42"/>
+    <p:handoutMasterId r:id="rId43"/>
   </p:handoutMasterIdLst>
   <p:sldIdLst>
     <p:sldId id="320" r:id="rId2"/>
@@ -47,14 +47,15 @@
     <p:sldId id="407" r:id="rId35"/>
     <p:sldId id="427" r:id="rId36"/>
     <p:sldId id="408" r:id="rId37"/>
-    <p:sldId id="383" r:id="rId38"/>
-    <p:sldId id="333" r:id="rId39"/>
-    <p:sldId id="428" r:id="rId40"/>
+    <p:sldId id="429" r:id="rId38"/>
+    <p:sldId id="383" r:id="rId39"/>
+    <p:sldId id="333" r:id="rId40"/>
+    <p:sldId id="428" r:id="rId41"/>
   </p:sldIdLst>
   <p:sldSz cx="9144000" cy="6858000" type="screen4x3"/>
   <p:notesSz cx="6881813" cy="9296400"/>
   <p:custDataLst>
-    <p:tags r:id="rId43"/>
+    <p:tags r:id="rId44"/>
   </p:custDataLst>
   <p:defaultTextStyle>
     <a:defPPr>
@@ -9536,8 +9537,8 @@
         </p:nvSpPr>
         <p:spPr bwMode="auto">
           <a:xfrm>
-            <a:off x="304800" y="920889"/>
-            <a:ext cx="8534400" cy="5632311"/>
+            <a:off x="228600" y="796290"/>
+            <a:ext cx="8610600" cy="5909310"/>
           </a:xfrm>
           <a:prstGeom prst="rect">
             <a:avLst/>
@@ -9577,7 +9578,7 @@
               <a:buSzPct val="70000"/>
             </a:pPr>
             <a:r>
-              <a:rPr lang="en-US" sz="1500" b="1" noProof="1">
+              <a:rPr lang="en-US" sz="1400" b="1" noProof="1">
                 <a:solidFill>
                   <a:schemeClr val="accent5">
                     <a:lumMod val="20000"/>
@@ -9596,7 +9597,7 @@
               <a:t>&lt;?xml version="1.0" encoding="utf-8</a:t>
             </a:r>
             <a:r>
-              <a:rPr lang="en-US" sz="1500" b="1" noProof="1" smtClean="0">
+              <a:rPr lang="en-US" sz="1400" b="1" noProof="1" smtClean="0">
                 <a:solidFill>
                   <a:schemeClr val="accent5">
                     <a:lumMod val="20000"/>
@@ -9614,7 +9615,7 @@
               </a:rPr>
               <a:t>"?&gt;</a:t>
             </a:r>
-            <a:endParaRPr lang="en-US" sz="1500" b="1" noProof="1">
+            <a:endParaRPr lang="en-US" sz="1400" b="1" noProof="1">
               <a:solidFill>
                 <a:schemeClr val="accent5">
                   <a:lumMod val="20000"/>
@@ -9645,7 +9646,7 @@
               <a:buSzPct val="70000"/>
             </a:pPr>
             <a:r>
-              <a:rPr lang="en-US" sz="1500" b="1" noProof="1">
+              <a:rPr lang="en-US" sz="1400" b="1" noProof="1">
                 <a:solidFill>
                   <a:schemeClr val="accent5">
                     <a:lumMod val="20000"/>
@@ -9678,7 +9679,7 @@
               <a:buSzPct val="70000"/>
             </a:pPr>
             <a:r>
-              <a:rPr lang="en-US" sz="1500" b="1" noProof="1">
+              <a:rPr lang="en-US" sz="1400" b="1" noProof="1">
                 <a:solidFill>
                   <a:schemeClr val="accent5">
                     <a:lumMod val="20000"/>
@@ -9694,7 +9695,26 @@
                 </a:effectLst>
                 <a:latin typeface="Consolas" pitchFamily="49" charset="0"/>
               </a:rPr>
-              <a:t>  &lt;configSections&gt;</a:t>
+              <a:t>  &lt;configSections</a:t>
+            </a:r>
+            <a:r>
+              <a:rPr lang="en-US" sz="1400" b="1" noProof="1" smtClean="0">
+                <a:solidFill>
+                  <a:schemeClr val="accent5">
+                    <a:lumMod val="20000"/>
+                    <a:lumOff val="80000"/>
+                  </a:schemeClr>
+                </a:solidFill>
+                <a:effectLst>
+                  <a:outerShdw blurRad="38100" dist="38100" dir="2700000" algn="tl">
+                    <a:srgbClr val="000000">
+                      <a:alpha val="43137"/>
+                    </a:srgbClr>
+                  </a:outerShdw>
+                </a:effectLst>
+                <a:latin typeface="Consolas" pitchFamily="49" charset="0"/>
+              </a:rPr>
+              <a:t>&gt;</a:t>
             </a:r>
           </a:p>
           <a:p>
@@ -9711,7 +9731,7 @@
               <a:buSzPct val="70000"/>
             </a:pPr>
             <a:r>
-              <a:rPr lang="en-US" sz="1500" b="1" noProof="1">
+              <a:rPr lang="en-US" sz="1400" b="1" noProof="1">
                 <a:solidFill>
                   <a:schemeClr val="accent5">
                     <a:lumMod val="20000"/>
@@ -9727,10 +9747,10 @@
                 </a:effectLst>
                 <a:latin typeface="Consolas" pitchFamily="49" charset="0"/>
               </a:rPr>
-              <a:t>    &lt;section name="entityFramework" requirePermission="</a:t>
-            </a:r>
-            <a:r>
-              <a:rPr lang="en-US" sz="1500" b="1" noProof="1" smtClean="0">
+              <a:t> </a:t>
+            </a:r>
+            <a:r>
+              <a:rPr lang="en-US" sz="1400" b="1" noProof="1">
                 <a:solidFill>
                   <a:schemeClr val="accent5">
                     <a:lumMod val="20000"/>
@@ -9746,406 +9766,9 @@
                 </a:effectLst>
                 <a:latin typeface="Consolas" pitchFamily="49" charset="0"/>
               </a:rPr>
-              <a:t>false" type=" System.Data.Entity.Internal.ConfigFile.EntityFrameworkSection</a:t>
-            </a:r>
-            <a:r>
-              <a:rPr lang="en-US" sz="1500" b="1" noProof="1">
-                <a:solidFill>
-                  <a:schemeClr val="accent5">
-                    <a:lumMod val="20000"/>
-                    <a:lumOff val="80000"/>
-                  </a:schemeClr>
-                </a:solidFill>
-                <a:effectLst>
-                  <a:outerShdw blurRad="38100" dist="38100" dir="2700000" algn="tl">
-                    <a:srgbClr val="000000">
-                      <a:alpha val="43137"/>
-                    </a:srgbClr>
-                  </a:outerShdw>
-                </a:effectLst>
-                <a:latin typeface="Consolas" pitchFamily="49" charset="0"/>
-              </a:rPr>
-              <a:t>, EntityFramework, Version=6.0.0.0, Culture=neutral, PublicKeyToken=b77a5c561934e089" /&gt;</a:t>
-            </a:r>
-          </a:p>
-          <a:p>
-            <a:pPr eaLnBrk="0" hangingPunct="0">
-              <a:spcBef>
-                <a:spcPts val="0"/>
-              </a:spcBef>
-              <a:buClr>
-                <a:schemeClr val="accent5">
-                  <a:lumMod val="40000"/>
-                  <a:lumOff val="60000"/>
-                </a:schemeClr>
-              </a:buClr>
-              <a:buSzPct val="70000"/>
-            </a:pPr>
-            <a:r>
-              <a:rPr lang="en-US" sz="1500" b="1" noProof="1">
-                <a:solidFill>
-                  <a:schemeClr val="accent5">
-                    <a:lumMod val="20000"/>
-                    <a:lumOff val="80000"/>
-                  </a:schemeClr>
-                </a:solidFill>
-                <a:effectLst>
-                  <a:outerShdw blurRad="38100" dist="38100" dir="2700000" algn="tl">
-                    <a:srgbClr val="000000">
-                      <a:alpha val="43137"/>
-                    </a:srgbClr>
-                  </a:outerShdw>
-                </a:effectLst>
-                <a:latin typeface="Consolas" pitchFamily="49" charset="0"/>
-              </a:rPr>
-              <a:t>  &lt;/configSections&gt;</a:t>
-            </a:r>
-          </a:p>
-          <a:p>
-            <a:pPr eaLnBrk="0" hangingPunct="0">
-              <a:spcBef>
-                <a:spcPts val="0"/>
-              </a:spcBef>
-              <a:buClr>
-                <a:schemeClr val="accent5">
-                  <a:lumMod val="40000"/>
-                  <a:lumOff val="60000"/>
-                </a:schemeClr>
-              </a:buClr>
-              <a:buSzPct val="70000"/>
-            </a:pPr>
-            <a:r>
-              <a:rPr lang="en-US" sz="1500" b="1" noProof="1">
-                <a:solidFill>
-                  <a:schemeClr val="accent5">
-                    <a:lumMod val="20000"/>
-                    <a:lumOff val="80000"/>
-                  </a:schemeClr>
-                </a:solidFill>
-                <a:effectLst>
-                  <a:outerShdw blurRad="38100" dist="38100" dir="2700000" algn="tl">
-                    <a:srgbClr val="000000">
-                      <a:alpha val="43137"/>
-                    </a:srgbClr>
-                  </a:outerShdw>
-                </a:effectLst>
-                <a:latin typeface="Consolas" pitchFamily="49" charset="0"/>
-              </a:rPr>
-              <a:t>  &lt;connectionStrings&gt;</a:t>
-            </a:r>
-          </a:p>
-          <a:p>
-            <a:pPr eaLnBrk="0" hangingPunct="0">
-              <a:spcBef>
-                <a:spcPts val="0"/>
-              </a:spcBef>
-              <a:buClr>
-                <a:schemeClr val="accent5">
-                  <a:lumMod val="40000"/>
-                  <a:lumOff val="60000"/>
-                </a:schemeClr>
-              </a:buClr>
-              <a:buSzPct val="70000"/>
-            </a:pPr>
-            <a:r>
-              <a:rPr lang="en-US" sz="1500" b="1" noProof="1">
-                <a:solidFill>
-                  <a:schemeClr val="accent5">
-                    <a:lumMod val="20000"/>
-                    <a:lumOff val="80000"/>
-                  </a:schemeClr>
-                </a:solidFill>
-                <a:effectLst>
-                  <a:outerShdw blurRad="38100" dist="38100" dir="2700000" algn="tl">
-                    <a:srgbClr val="000000">
-                      <a:alpha val="43137"/>
-                    </a:srgbClr>
-                  </a:outerShdw>
-                </a:effectLst>
-                <a:latin typeface="Consolas" pitchFamily="49" charset="0"/>
-              </a:rPr>
-              <a:t>    &lt;add name="DefaultConnection" providerName="System.Data.SqlClient"</a:t>
-            </a:r>
-          </a:p>
-          <a:p>
-            <a:pPr eaLnBrk="0" hangingPunct="0">
-              <a:spcBef>
-                <a:spcPts val="0"/>
-              </a:spcBef>
-              <a:buClr>
-                <a:schemeClr val="accent5">
-                  <a:lumMod val="40000"/>
-                  <a:lumOff val="60000"/>
-                </a:schemeClr>
-              </a:buClr>
-              <a:buSzPct val="70000"/>
-            </a:pPr>
-            <a:r>
-              <a:rPr lang="en-US" sz="1500" b="1" noProof="1" smtClean="0">
-                <a:solidFill>
-                  <a:schemeClr val="accent5">
-                    <a:lumMod val="20000"/>
-                    <a:lumOff val="80000"/>
-                  </a:schemeClr>
-                </a:solidFill>
-                <a:effectLst>
-                  <a:outerShdw blurRad="38100" dist="38100" dir="2700000" algn="tl">
-                    <a:srgbClr val="000000">
-                      <a:alpha val="43137"/>
-                    </a:srgbClr>
-                  </a:outerShdw>
-                </a:effectLst>
-                <a:latin typeface="Consolas" pitchFamily="49" charset="0"/>
-              </a:rPr>
-              <a:t>connectionString</a:t>
-            </a:r>
-            <a:r>
-              <a:rPr lang="en-US" sz="1500" b="1" noProof="1">
-                <a:solidFill>
-                  <a:schemeClr val="accent5">
-                    <a:lumMod val="20000"/>
-                    <a:lumOff val="80000"/>
-                  </a:schemeClr>
-                </a:solidFill>
-                <a:effectLst>
-                  <a:outerShdw blurRad="38100" dist="38100" dir="2700000" algn="tl">
-                    <a:srgbClr val="000000">
-                      <a:alpha val="43137"/>
-                    </a:srgbClr>
-                  </a:outerShdw>
-                </a:effectLst>
-                <a:latin typeface="Consolas" pitchFamily="49" charset="0"/>
-              </a:rPr>
-              <a:t>="Data Source=(LocalDb)\v11.0;AttachDbFilename</a:t>
-            </a:r>
-            <a:r>
-              <a:rPr lang="en-US" sz="1500" b="1" noProof="1" smtClean="0">
-                <a:solidFill>
-                  <a:schemeClr val="accent5">
-                    <a:lumMod val="20000"/>
-                    <a:lumOff val="80000"/>
-                  </a:schemeClr>
-                </a:solidFill>
-                <a:effectLst>
-                  <a:outerShdw blurRad="38100" dist="38100" dir="2700000" algn="tl">
-                    <a:srgbClr val="000000">
-                      <a:alpha val="43137"/>
-                    </a:srgbClr>
-                  </a:outerShdw>
-                </a:effectLst>
-                <a:latin typeface="Consolas" pitchFamily="49" charset="0"/>
-              </a:rPr>
-              <a:t>=|</a:t>
-            </a:r>
-            <a:r>
-              <a:rPr lang="en-US" sz="1500" b="1" noProof="1">
-                <a:solidFill>
-                  <a:schemeClr val="accent5">
-                    <a:lumMod val="20000"/>
-                    <a:lumOff val="80000"/>
-                  </a:schemeClr>
-                </a:solidFill>
-                <a:effectLst>
-                  <a:outerShdw blurRad="38100" dist="38100" dir="2700000" algn="tl">
-                    <a:srgbClr val="000000">
-                      <a:alpha val="43137"/>
-                    </a:srgbClr>
-                  </a:outerShdw>
-                </a:effectLst>
-                <a:latin typeface="Consolas" pitchFamily="49" charset="0"/>
-              </a:rPr>
-              <a:t>DataDirectory</a:t>
-            </a:r>
-            <a:r>
-              <a:rPr lang="en-US" sz="1500" b="1" noProof="1" smtClean="0">
-                <a:solidFill>
-                  <a:schemeClr val="accent5">
-                    <a:lumMod val="20000"/>
-                    <a:lumOff val="80000"/>
-                  </a:schemeClr>
-                </a:solidFill>
-                <a:effectLst>
-                  <a:outerShdw blurRad="38100" dist="38100" dir="2700000" algn="tl">
-                    <a:srgbClr val="000000">
-                      <a:alpha val="43137"/>
-                    </a:srgbClr>
-                  </a:outerShdw>
-                </a:effectLst>
-                <a:latin typeface="Consolas" pitchFamily="49" charset="0"/>
-              </a:rPr>
-              <a:t>|\ aspnetDB.mdf;Initial Catalog=aspnet;Integrated </a:t>
-            </a:r>
-            <a:r>
-              <a:rPr lang="en-US" sz="1500" b="1" noProof="1">
-                <a:solidFill>
-                  <a:schemeClr val="accent5">
-                    <a:lumMod val="20000"/>
-                    <a:lumOff val="80000"/>
-                  </a:schemeClr>
-                </a:solidFill>
-                <a:effectLst>
-                  <a:outerShdw blurRad="38100" dist="38100" dir="2700000" algn="tl">
-                    <a:srgbClr val="000000">
-                      <a:alpha val="43137"/>
-                    </a:srgbClr>
-                  </a:outerShdw>
-                </a:effectLst>
-                <a:latin typeface="Consolas" pitchFamily="49" charset="0"/>
-              </a:rPr>
-              <a:t>Security=True" /&gt;</a:t>
-            </a:r>
-          </a:p>
-          <a:p>
-            <a:pPr eaLnBrk="0" hangingPunct="0">
-              <a:spcBef>
-                <a:spcPts val="0"/>
-              </a:spcBef>
-              <a:buClr>
-                <a:schemeClr val="accent5">
-                  <a:lumMod val="40000"/>
-                  <a:lumOff val="60000"/>
-                </a:schemeClr>
-              </a:buClr>
-              <a:buSzPct val="70000"/>
-            </a:pPr>
-            <a:r>
-              <a:rPr lang="en-US" sz="1500" b="1" noProof="1">
-                <a:solidFill>
-                  <a:schemeClr val="accent5">
-                    <a:lumMod val="20000"/>
-                    <a:lumOff val="80000"/>
-                  </a:schemeClr>
-                </a:solidFill>
-                <a:effectLst>
-                  <a:outerShdw blurRad="38100" dist="38100" dir="2700000" algn="tl">
-                    <a:srgbClr val="000000">
-                      <a:alpha val="43137"/>
-                    </a:srgbClr>
-                  </a:outerShdw>
-                </a:effectLst>
-                <a:latin typeface="Consolas" pitchFamily="49" charset="0"/>
-              </a:rPr>
-              <a:t>  &lt;/connectionStrings&gt;</a:t>
-            </a:r>
-          </a:p>
-          <a:p>
-            <a:pPr eaLnBrk="0" hangingPunct="0">
-              <a:spcBef>
-                <a:spcPts val="0"/>
-              </a:spcBef>
-              <a:buClr>
-                <a:schemeClr val="accent5">
-                  <a:lumMod val="40000"/>
-                  <a:lumOff val="60000"/>
-                </a:schemeClr>
-              </a:buClr>
-              <a:buSzPct val="70000"/>
-            </a:pPr>
-            <a:r>
-              <a:rPr lang="en-US" sz="1500" b="1" noProof="1">
-                <a:solidFill>
-                  <a:schemeClr val="accent5">
-                    <a:lumMod val="20000"/>
-                    <a:lumOff val="80000"/>
-                  </a:schemeClr>
-                </a:solidFill>
-                <a:effectLst>
-                  <a:outerShdw blurRad="38100" dist="38100" dir="2700000" algn="tl">
-                    <a:srgbClr val="000000">
-                      <a:alpha val="43137"/>
-                    </a:srgbClr>
-                  </a:outerShdw>
-                </a:effectLst>
-                <a:latin typeface="Consolas" pitchFamily="49" charset="0"/>
-              </a:rPr>
-              <a:t>  &lt;appSettings&gt;</a:t>
-            </a:r>
-          </a:p>
-          <a:p>
-            <a:pPr eaLnBrk="0" hangingPunct="0">
-              <a:spcBef>
-                <a:spcPts val="0"/>
-              </a:spcBef>
-              <a:buClr>
-                <a:schemeClr val="accent5">
-                  <a:lumMod val="40000"/>
-                  <a:lumOff val="60000"/>
-                </a:schemeClr>
-              </a:buClr>
-              <a:buSzPct val="70000"/>
-            </a:pPr>
-            <a:r>
-              <a:rPr lang="en-US" sz="1500" b="1" noProof="1">
-                <a:solidFill>
-                  <a:schemeClr val="accent5">
-                    <a:lumMod val="20000"/>
-                    <a:lumOff val="80000"/>
-                  </a:schemeClr>
-                </a:solidFill>
-                <a:effectLst>
-                  <a:outerShdw blurRad="38100" dist="38100" dir="2700000" algn="tl">
-                    <a:srgbClr val="000000">
-                      <a:alpha val="43137"/>
-                    </a:srgbClr>
-                  </a:outerShdw>
-                </a:effectLst>
-                <a:latin typeface="Consolas" pitchFamily="49" charset="0"/>
-              </a:rPr>
-              <a:t>    &lt;add key="ClientValidationEnabled" value="true" /&gt;</a:t>
-            </a:r>
-          </a:p>
-          <a:p>
-            <a:pPr eaLnBrk="0" hangingPunct="0">
-              <a:spcBef>
-                <a:spcPts val="0"/>
-              </a:spcBef>
-              <a:buClr>
-                <a:schemeClr val="accent5">
-                  <a:lumMod val="40000"/>
-                  <a:lumOff val="60000"/>
-                </a:schemeClr>
-              </a:buClr>
-              <a:buSzPct val="70000"/>
-            </a:pPr>
-            <a:r>
-              <a:rPr lang="en-US" sz="1500" b="1" noProof="1">
-                <a:solidFill>
-                  <a:schemeClr val="accent5">
-                    <a:lumMod val="20000"/>
-                    <a:lumOff val="80000"/>
-                  </a:schemeClr>
-                </a:solidFill>
-                <a:effectLst>
-                  <a:outerShdw blurRad="38100" dist="38100" dir="2700000" algn="tl">
-                    <a:srgbClr val="000000">
-                      <a:alpha val="43137"/>
-                    </a:srgbClr>
-                  </a:outerShdw>
-                </a:effectLst>
-                <a:latin typeface="Consolas" pitchFamily="49" charset="0"/>
-              </a:rPr>
-              <a:t>    </a:t>
-            </a:r>
-            <a:r>
-              <a:rPr lang="en-US" sz="1500" b="1" noProof="1" smtClean="0">
-                <a:solidFill>
-                  <a:schemeClr val="accent5">
-                    <a:lumMod val="20000"/>
-                    <a:lumOff val="80000"/>
-                  </a:schemeClr>
-                </a:solidFill>
-                <a:effectLst>
-                  <a:outerShdw blurRad="38100" dist="38100" dir="2700000" algn="tl">
-                    <a:srgbClr val="000000">
-                      <a:alpha val="43137"/>
-                    </a:srgbClr>
-                  </a:outerShdw>
-                </a:effectLst>
-                <a:latin typeface="Consolas" pitchFamily="49" charset="0"/>
-              </a:rPr>
-              <a:t>…</a:t>
-            </a:r>
-            <a:endParaRPr lang="en-US" sz="1500" b="1" noProof="1">
+              <a:t>   &lt;section name="entityFramework" type="System.Data.Entity.Internal.ConfigFile.EntityFrameworkSection, EntityFramework, Version=6.0.0.0, Culture=neutral, PublicKeyToken=b77a5c561934e089" requirePermission="false" /&gt;</a:t>
+            </a:r>
+            <a:endParaRPr lang="en-US" sz="1400" b="1" noProof="1">
               <a:solidFill>
                 <a:schemeClr val="accent5">
                   <a:lumMod val="20000"/>
@@ -10176,7 +9799,7 @@
               <a:buSzPct val="70000"/>
             </a:pPr>
             <a:r>
-              <a:rPr lang="en-US" sz="1500" b="1" noProof="1">
+              <a:rPr lang="en-US" sz="1400" b="1" noProof="1" smtClean="0">
                 <a:solidFill>
                   <a:schemeClr val="accent5">
                     <a:lumMod val="20000"/>
@@ -10192,7 +9815,7 @@
                 </a:effectLst>
                 <a:latin typeface="Consolas" pitchFamily="49" charset="0"/>
               </a:rPr>
-              <a:t>  &lt;/appSettings&gt;</a:t>
+              <a:t>  &lt;/configSections&gt;</a:t>
             </a:r>
           </a:p>
           <a:p>
@@ -10209,7 +9832,7 @@
               <a:buSzPct val="70000"/>
             </a:pPr>
             <a:r>
-              <a:rPr lang="en-US" sz="1500" b="1" noProof="1">
+              <a:rPr lang="en-US" sz="1400" b="1" noProof="1" smtClean="0">
                 <a:solidFill>
                   <a:schemeClr val="accent5">
                     <a:lumMod val="20000"/>
@@ -10225,7 +9848,26 @@
                 </a:effectLst>
                 <a:latin typeface="Consolas" pitchFamily="49" charset="0"/>
               </a:rPr>
-              <a:t>  &lt;system.web&gt;</a:t>
+              <a:t>  </a:t>
+            </a:r>
+            <a:r>
+              <a:rPr lang="en-US" sz="1400" b="1" noProof="1">
+                <a:solidFill>
+                  <a:schemeClr val="accent5">
+                    <a:lumMod val="20000"/>
+                    <a:lumOff val="80000"/>
+                  </a:schemeClr>
+                </a:solidFill>
+                <a:effectLst>
+                  <a:outerShdw blurRad="38100" dist="38100" dir="2700000" algn="tl">
+                    <a:srgbClr val="000000">
+                      <a:alpha val="43137"/>
+                    </a:srgbClr>
+                  </a:outerShdw>
+                </a:effectLst>
+                <a:latin typeface="Consolas" pitchFamily="49" charset="0"/>
+              </a:rPr>
+              <a:t>&lt;connectionStrings&gt;</a:t>
             </a:r>
           </a:p>
           <a:p>
@@ -10242,7 +9884,7 @@
               <a:buSzPct val="70000"/>
             </a:pPr>
             <a:r>
-              <a:rPr lang="en-US" sz="1500" b="1" noProof="1">
+              <a:rPr lang="en-US" sz="1400" b="1" noProof="1">
                 <a:solidFill>
                   <a:schemeClr val="accent5">
                     <a:lumMod val="20000"/>
@@ -10258,10 +9900,10 @@
                 </a:effectLst>
                 <a:latin typeface="Consolas" pitchFamily="49" charset="0"/>
               </a:rPr>
-              <a:t>    &lt;compilation debug="true" targetFramework="4.5" </a:t>
-            </a:r>
-            <a:r>
-              <a:rPr lang="en-US" sz="1500" b="1" noProof="1" smtClean="0">
+              <a:t>    &lt;add name="DefaultConnection" connectionString="Data Source=(LocalDb)\v11.0;AttachDbFilename=|DataDirectory</a:t>
+            </a:r>
+            <a:r>
+              <a:rPr lang="en-US" sz="1400" b="1" noProof="1">
                 <a:solidFill>
                   <a:schemeClr val="accent5">
                     <a:lumMod val="20000"/>
@@ -10277,7 +9919,139 @@
                 </a:effectLst>
                 <a:latin typeface="Consolas" pitchFamily="49" charset="0"/>
               </a:rPr>
+              <a:t>|\</a:t>
+            </a:r>
+            <a:r>
+              <a:rPr lang="en-US" sz="1400" b="1" noProof="1" smtClean="0">
+                <a:solidFill>
+                  <a:schemeClr val="accent5">
+                    <a:lumMod val="20000"/>
+                    <a:lumOff val="80000"/>
+                  </a:schemeClr>
+                </a:solidFill>
+                <a:effectLst>
+                  <a:outerShdw blurRad="38100" dist="38100" dir="2700000" algn="tl">
+                    <a:srgbClr val="000000">
+                      <a:alpha val="43137"/>
+                    </a:srgbClr>
+                  </a:outerShdw>
+                </a:effectLst>
+                <a:latin typeface="Consolas" pitchFamily="49" charset="0"/>
+              </a:rPr>
+              <a:t>aspnet.mdf;Initial Catalog=aspnet;Integrated Security=True“ providerName</a:t>
+            </a:r>
+            <a:r>
+              <a:rPr lang="en-US" sz="1400" b="1" noProof="1">
+                <a:solidFill>
+                  <a:schemeClr val="accent5">
+                    <a:lumMod val="20000"/>
+                    <a:lumOff val="80000"/>
+                  </a:schemeClr>
+                </a:solidFill>
+                <a:effectLst>
+                  <a:outerShdw blurRad="38100" dist="38100" dir="2700000" algn="tl">
+                    <a:srgbClr val="000000">
+                      <a:alpha val="43137"/>
+                    </a:srgbClr>
+                  </a:outerShdw>
+                </a:effectLst>
+                <a:latin typeface="Consolas" pitchFamily="49" charset="0"/>
+              </a:rPr>
+              <a:t>="System.Data.SqlClient</a:t>
+            </a:r>
+            <a:r>
+              <a:rPr lang="en-US" sz="1400" b="1" noProof="1">
+                <a:solidFill>
+                  <a:schemeClr val="accent5">
+                    <a:lumMod val="20000"/>
+                    <a:lumOff val="80000"/>
+                  </a:schemeClr>
+                </a:solidFill>
+                <a:effectLst>
+                  <a:outerShdw blurRad="38100" dist="38100" dir="2700000" algn="tl">
+                    <a:srgbClr val="000000">
+                      <a:alpha val="43137"/>
+                    </a:srgbClr>
+                  </a:outerShdw>
+                </a:effectLst>
+                <a:latin typeface="Consolas" pitchFamily="49" charset="0"/>
+              </a:rPr>
+              <a:t>" </a:t>
+            </a:r>
+            <a:r>
+              <a:rPr lang="en-US" sz="1400" b="1" noProof="1" smtClean="0">
+                <a:solidFill>
+                  <a:schemeClr val="accent5">
+                    <a:lumMod val="20000"/>
+                    <a:lumOff val="80000"/>
+                  </a:schemeClr>
+                </a:solidFill>
+                <a:effectLst>
+                  <a:outerShdw blurRad="38100" dist="38100" dir="2700000" algn="tl">
+                    <a:srgbClr val="000000">
+                      <a:alpha val="43137"/>
+                    </a:srgbClr>
+                  </a:outerShdw>
+                </a:effectLst>
+                <a:latin typeface="Consolas" pitchFamily="49" charset="0"/>
+              </a:rPr>
               <a:t>/&gt;</a:t>
+            </a:r>
+            <a:br>
+              <a:rPr lang="en-US" sz="1400" b="1" noProof="1" smtClean="0">
+                <a:solidFill>
+                  <a:schemeClr val="accent5">
+                    <a:lumMod val="20000"/>
+                    <a:lumOff val="80000"/>
+                  </a:schemeClr>
+                </a:solidFill>
+                <a:effectLst>
+                  <a:outerShdw blurRad="38100" dist="38100" dir="2700000" algn="tl">
+                    <a:srgbClr val="000000">
+                      <a:alpha val="43137"/>
+                    </a:srgbClr>
+                  </a:outerShdw>
+                </a:effectLst>
+                <a:latin typeface="Consolas" pitchFamily="49" charset="0"/>
+              </a:rPr>
+            </a:br>
+            <a:r>
+              <a:rPr lang="en-US" sz="1400" b="1" noProof="1" smtClean="0">
+                <a:solidFill>
+                  <a:schemeClr val="accent5">
+                    <a:lumMod val="20000"/>
+                    <a:lumOff val="80000"/>
+                  </a:schemeClr>
+                </a:solidFill>
+                <a:effectLst>
+                  <a:outerShdw blurRad="38100" dist="38100" dir="2700000" algn="tl">
+                    <a:srgbClr val="000000">
+                      <a:alpha val="43137"/>
+                    </a:srgbClr>
+                  </a:outerShdw>
+                </a:effectLst>
+                <a:latin typeface="Consolas" pitchFamily="49" charset="0"/>
+              </a:rPr>
+              <a:t>  &lt;/</a:t>
+            </a:r>
+            <a:r>
+              <a:rPr lang="en-US" sz="1400" b="1" noProof="1">
+                <a:solidFill>
+                  <a:schemeClr val="accent5">
+                    <a:lumMod val="20000"/>
+                    <a:lumOff val="80000"/>
+                  </a:schemeClr>
+                </a:solidFill>
+                <a:effectLst>
+                  <a:outerShdw blurRad="38100" dist="38100" dir="2700000" algn="tl">
+                    <a:srgbClr val="000000">
+                      <a:alpha val="43137"/>
+                    </a:srgbClr>
+                  </a:outerShdw>
+                </a:effectLst>
+                <a:latin typeface="Consolas" pitchFamily="49" charset="0"/>
+              </a:rPr>
+              <a:t>connectionStrings&gt;</a:t>
             </a:r>
           </a:p>
           <a:p>
@@ -10294,7 +10068,7 @@
               <a:buSzPct val="70000"/>
             </a:pPr>
             <a:r>
-              <a:rPr lang="en-US" sz="1500" b="1" noProof="1">
+              <a:rPr lang="en-US" sz="1400" b="1" noProof="1" smtClean="0">
                 <a:solidFill>
                   <a:schemeClr val="accent5">
                     <a:lumMod val="20000"/>
@@ -10310,10 +10084,10 @@
                 </a:effectLst>
                 <a:latin typeface="Consolas" pitchFamily="49" charset="0"/>
               </a:rPr>
-              <a:t> </a:t>
-            </a:r>
-            <a:r>
-              <a:rPr lang="en-US" sz="1500" b="1" noProof="1" smtClean="0">
+              <a:t>  </a:t>
+            </a:r>
+            <a:r>
+              <a:rPr lang="en-US" sz="1400" b="1" noProof="1">
                 <a:solidFill>
                   <a:schemeClr val="accent5">
                     <a:lumMod val="20000"/>
@@ -10329,9 +10103,425 @@
                 </a:effectLst>
                 <a:latin typeface="Consolas" pitchFamily="49" charset="0"/>
               </a:rPr>
+              <a:t>&lt;appSettings&gt;</a:t>
+            </a:r>
+          </a:p>
+          <a:p>
+            <a:pPr eaLnBrk="0" hangingPunct="0">
+              <a:spcBef>
+                <a:spcPts val="0"/>
+              </a:spcBef>
+              <a:buClr>
+                <a:schemeClr val="accent5">
+                  <a:lumMod val="40000"/>
+                  <a:lumOff val="60000"/>
+                </a:schemeClr>
+              </a:buClr>
+              <a:buSzPct val="70000"/>
+            </a:pPr>
+            <a:r>
+              <a:rPr lang="en-US" sz="1400" b="1" noProof="1">
+                <a:solidFill>
+                  <a:schemeClr val="accent5">
+                    <a:lumMod val="20000"/>
+                    <a:lumOff val="80000"/>
+                  </a:schemeClr>
+                </a:solidFill>
+                <a:effectLst>
+                  <a:outerShdw blurRad="38100" dist="38100" dir="2700000" algn="tl">
+                    <a:srgbClr val="000000">
+                      <a:alpha val="43137"/>
+                    </a:srgbClr>
+                  </a:outerShdw>
+                </a:effectLst>
+                <a:latin typeface="Consolas" pitchFamily="49" charset="0"/>
+              </a:rPr>
+              <a:t> </a:t>
+            </a:r>
+            <a:r>
+              <a:rPr lang="en-US" sz="1400" b="1" noProof="1">
+                <a:solidFill>
+                  <a:schemeClr val="accent5">
+                    <a:lumMod val="20000"/>
+                    <a:lumOff val="80000"/>
+                  </a:schemeClr>
+                </a:solidFill>
+                <a:effectLst>
+                  <a:outerShdw blurRad="38100" dist="38100" dir="2700000" algn="tl">
+                    <a:srgbClr val="000000">
+                      <a:alpha val="43137"/>
+                    </a:srgbClr>
+                  </a:outerShdw>
+                </a:effectLst>
+                <a:latin typeface="Consolas" pitchFamily="49" charset="0"/>
+              </a:rPr>
+              <a:t>   &lt;add key="webpages:Enabled" value="false" /&gt;</a:t>
+            </a:r>
+          </a:p>
+          <a:p>
+            <a:pPr eaLnBrk="0" hangingPunct="0">
+              <a:spcBef>
+                <a:spcPts val="0"/>
+              </a:spcBef>
+              <a:buClr>
+                <a:schemeClr val="accent5">
+                  <a:lumMod val="40000"/>
+                  <a:lumOff val="60000"/>
+                </a:schemeClr>
+              </a:buClr>
+              <a:buSzPct val="70000"/>
+            </a:pPr>
+            <a:r>
+              <a:rPr lang="en-US" sz="1400" b="1" noProof="1">
+                <a:solidFill>
+                  <a:schemeClr val="accent5">
+                    <a:lumMod val="20000"/>
+                    <a:lumOff val="80000"/>
+                  </a:schemeClr>
+                </a:solidFill>
+                <a:effectLst>
+                  <a:outerShdw blurRad="38100" dist="38100" dir="2700000" algn="tl">
+                    <a:srgbClr val="000000">
+                      <a:alpha val="43137"/>
+                    </a:srgbClr>
+                  </a:outerShdw>
+                </a:effectLst>
+                <a:latin typeface="Consolas" pitchFamily="49" charset="0"/>
+              </a:rPr>
+              <a:t> </a:t>
+            </a:r>
+            <a:r>
+              <a:rPr lang="en-US" sz="1400" b="1" noProof="1" smtClean="0">
+                <a:solidFill>
+                  <a:schemeClr val="accent5">
+                    <a:lumMod val="20000"/>
+                    <a:lumOff val="80000"/>
+                  </a:schemeClr>
+                </a:solidFill>
+                <a:effectLst>
+                  <a:outerShdw blurRad="38100" dist="38100" dir="2700000" algn="tl">
+                    <a:srgbClr val="000000">
+                      <a:alpha val="43137"/>
+                    </a:srgbClr>
+                  </a:outerShdw>
+                </a:effectLst>
+                <a:latin typeface="Consolas" pitchFamily="49" charset="0"/>
+              </a:rPr>
+              <a:t>   &lt;</a:t>
+            </a:r>
+            <a:r>
+              <a:rPr lang="en-US" sz="1400" b="1" noProof="1">
+                <a:solidFill>
+                  <a:schemeClr val="accent5">
+                    <a:lumMod val="20000"/>
+                    <a:lumOff val="80000"/>
+                  </a:schemeClr>
+                </a:solidFill>
+                <a:effectLst>
+                  <a:outerShdw blurRad="38100" dist="38100" dir="2700000" algn="tl">
+                    <a:srgbClr val="000000">
+                      <a:alpha val="43137"/>
+                    </a:srgbClr>
+                  </a:outerShdw>
+                </a:effectLst>
+                <a:latin typeface="Consolas" pitchFamily="49" charset="0"/>
+              </a:rPr>
+              <a:t>add key="ClientValidationEnabled" value="true" /&gt;</a:t>
+            </a:r>
+          </a:p>
+          <a:p>
+            <a:pPr eaLnBrk="0" hangingPunct="0">
+              <a:spcBef>
+                <a:spcPts val="0"/>
+              </a:spcBef>
+              <a:buClr>
+                <a:schemeClr val="accent5">
+                  <a:lumMod val="40000"/>
+                  <a:lumOff val="60000"/>
+                </a:schemeClr>
+              </a:buClr>
+              <a:buSzPct val="70000"/>
+            </a:pPr>
+            <a:r>
+              <a:rPr lang="en-US" sz="1400" b="1" noProof="1">
+                <a:solidFill>
+                  <a:schemeClr val="accent5">
+                    <a:lumMod val="20000"/>
+                    <a:lumOff val="80000"/>
+                  </a:schemeClr>
+                </a:solidFill>
+                <a:effectLst>
+                  <a:outerShdw blurRad="38100" dist="38100" dir="2700000" algn="tl">
+                    <a:srgbClr val="000000">
+                      <a:alpha val="43137"/>
+                    </a:srgbClr>
+                  </a:outerShdw>
+                </a:effectLst>
+                <a:latin typeface="Consolas" pitchFamily="49" charset="0"/>
+              </a:rPr>
+              <a:t>    &lt;add key="UnobtrusiveJavaScriptEnabled" value="true</a:t>
+            </a:r>
+            <a:r>
+              <a:rPr lang="en-US" sz="1400" b="1" noProof="1">
+                <a:solidFill>
+                  <a:schemeClr val="accent5">
+                    <a:lumMod val="20000"/>
+                    <a:lumOff val="80000"/>
+                  </a:schemeClr>
+                </a:solidFill>
+                <a:effectLst>
+                  <a:outerShdw blurRad="38100" dist="38100" dir="2700000" algn="tl">
+                    <a:srgbClr val="000000">
+                      <a:alpha val="43137"/>
+                    </a:srgbClr>
+                  </a:outerShdw>
+                </a:effectLst>
+                <a:latin typeface="Consolas" pitchFamily="49" charset="0"/>
+              </a:rPr>
+              <a:t>" </a:t>
+            </a:r>
+            <a:r>
+              <a:rPr lang="en-US" sz="1400" b="1" noProof="1" smtClean="0">
+                <a:solidFill>
+                  <a:schemeClr val="accent5">
+                    <a:lumMod val="20000"/>
+                    <a:lumOff val="80000"/>
+                  </a:schemeClr>
+                </a:solidFill>
+                <a:effectLst>
+                  <a:outerShdw blurRad="38100" dist="38100" dir="2700000" algn="tl">
+                    <a:srgbClr val="000000">
+                      <a:alpha val="43137"/>
+                    </a:srgbClr>
+                  </a:outerShdw>
+                </a:effectLst>
+                <a:latin typeface="Consolas" pitchFamily="49" charset="0"/>
+              </a:rPr>
+              <a:t>/&gt;</a:t>
+            </a:r>
+          </a:p>
+          <a:p>
+            <a:pPr eaLnBrk="0" hangingPunct="0">
+              <a:spcBef>
+                <a:spcPts val="0"/>
+              </a:spcBef>
+              <a:buClr>
+                <a:schemeClr val="accent5">
+                  <a:lumMod val="40000"/>
+                  <a:lumOff val="60000"/>
+                </a:schemeClr>
+              </a:buClr>
+              <a:buSzPct val="70000"/>
+            </a:pPr>
+            <a:r>
+              <a:rPr lang="en-US" sz="1400" b="1" noProof="1" smtClean="0">
+                <a:solidFill>
+                  <a:schemeClr val="accent5">
+                    <a:lumMod val="20000"/>
+                    <a:lumOff val="80000"/>
+                  </a:schemeClr>
+                </a:solidFill>
+                <a:effectLst>
+                  <a:outerShdw blurRad="38100" dist="38100" dir="2700000" algn="tl">
+                    <a:srgbClr val="000000">
+                      <a:alpha val="43137"/>
+                    </a:srgbClr>
+                  </a:outerShdw>
+                </a:effectLst>
+                <a:latin typeface="Consolas" pitchFamily="49" charset="0"/>
+              </a:rPr>
+              <a:t>    …</a:t>
+            </a:r>
+          </a:p>
+          <a:p>
+            <a:pPr eaLnBrk="0" hangingPunct="0">
+              <a:spcBef>
+                <a:spcPts val="0"/>
+              </a:spcBef>
+              <a:buClr>
+                <a:schemeClr val="accent5">
+                  <a:lumMod val="40000"/>
+                  <a:lumOff val="60000"/>
+                </a:schemeClr>
+              </a:buClr>
+              <a:buSzPct val="70000"/>
+            </a:pPr>
+            <a:r>
+              <a:rPr lang="en-US" sz="1400" b="1" noProof="1" smtClean="0">
+                <a:solidFill>
+                  <a:schemeClr val="accent5">
+                    <a:lumMod val="20000"/>
+                    <a:lumOff val="80000"/>
+                  </a:schemeClr>
+                </a:solidFill>
+                <a:effectLst>
+                  <a:outerShdw blurRad="38100" dist="38100" dir="2700000" algn="tl">
+                    <a:srgbClr val="000000">
+                      <a:alpha val="43137"/>
+                    </a:srgbClr>
+                  </a:outerShdw>
+                </a:effectLst>
+                <a:latin typeface="Consolas" pitchFamily="49" charset="0"/>
+              </a:rPr>
+              <a:t>  &lt;/appSettings&gt;</a:t>
+            </a:r>
+          </a:p>
+          <a:p>
+            <a:pPr eaLnBrk="0" hangingPunct="0">
+              <a:spcBef>
+                <a:spcPts val="0"/>
+              </a:spcBef>
+              <a:buClr>
+                <a:schemeClr val="accent5">
+                  <a:lumMod val="40000"/>
+                  <a:lumOff val="60000"/>
+                </a:schemeClr>
+              </a:buClr>
+              <a:buSzPct val="70000"/>
+            </a:pPr>
+            <a:r>
+              <a:rPr lang="en-US" sz="1400" b="1" noProof="1" smtClean="0">
+                <a:solidFill>
+                  <a:schemeClr val="accent5">
+                    <a:lumMod val="20000"/>
+                    <a:lumOff val="80000"/>
+                  </a:schemeClr>
+                </a:solidFill>
+                <a:effectLst>
+                  <a:outerShdw blurRad="38100" dist="38100" dir="2700000" algn="tl">
+                    <a:srgbClr val="000000">
+                      <a:alpha val="43137"/>
+                    </a:srgbClr>
+                  </a:outerShdw>
+                </a:effectLst>
+                <a:latin typeface="Consolas" pitchFamily="49" charset="0"/>
+              </a:rPr>
+              <a:t>  </a:t>
+            </a:r>
+            <a:r>
+              <a:rPr lang="en-US" sz="1400" b="1" noProof="1">
+                <a:solidFill>
+                  <a:schemeClr val="accent5">
+                    <a:lumMod val="20000"/>
+                    <a:lumOff val="80000"/>
+                  </a:schemeClr>
+                </a:solidFill>
+                <a:effectLst>
+                  <a:outerShdw blurRad="38100" dist="38100" dir="2700000" algn="tl">
+                    <a:srgbClr val="000000">
+                      <a:alpha val="43137"/>
+                    </a:srgbClr>
+                  </a:outerShdw>
+                </a:effectLst>
+                <a:latin typeface="Consolas" pitchFamily="49" charset="0"/>
+              </a:rPr>
+              <a:t>&lt;system.web&gt;</a:t>
+            </a:r>
+          </a:p>
+          <a:p>
+            <a:pPr eaLnBrk="0" hangingPunct="0">
+              <a:spcBef>
+                <a:spcPts val="0"/>
+              </a:spcBef>
+              <a:buClr>
+                <a:schemeClr val="accent5">
+                  <a:lumMod val="40000"/>
+                  <a:lumOff val="60000"/>
+                </a:schemeClr>
+              </a:buClr>
+              <a:buSzPct val="70000"/>
+            </a:pPr>
+            <a:r>
+              <a:rPr lang="en-US" sz="1400" b="1" noProof="1">
+                <a:solidFill>
+                  <a:schemeClr val="accent5">
+                    <a:lumMod val="20000"/>
+                    <a:lumOff val="80000"/>
+                  </a:schemeClr>
+                </a:solidFill>
+                <a:effectLst>
+                  <a:outerShdw blurRad="38100" dist="38100" dir="2700000" algn="tl">
+                    <a:srgbClr val="000000">
+                      <a:alpha val="43137"/>
+                    </a:srgbClr>
+                  </a:outerShdw>
+                </a:effectLst>
+                <a:latin typeface="Consolas" pitchFamily="49" charset="0"/>
+              </a:rPr>
+              <a:t>    &lt;compilation debug="true" targetFramework="4.5" </a:t>
+            </a:r>
+            <a:r>
+              <a:rPr lang="en-US" sz="1400" b="1" noProof="1" smtClean="0">
+                <a:solidFill>
+                  <a:schemeClr val="accent5">
+                    <a:lumMod val="20000"/>
+                    <a:lumOff val="80000"/>
+                  </a:schemeClr>
+                </a:solidFill>
+                <a:effectLst>
+                  <a:outerShdw blurRad="38100" dist="38100" dir="2700000" algn="tl">
+                    <a:srgbClr val="000000">
+                      <a:alpha val="43137"/>
+                    </a:srgbClr>
+                  </a:outerShdw>
+                </a:effectLst>
+                <a:latin typeface="Consolas" pitchFamily="49" charset="0"/>
+              </a:rPr>
+              <a:t>/&gt;</a:t>
+            </a:r>
+          </a:p>
+          <a:p>
+            <a:pPr eaLnBrk="0" hangingPunct="0">
+              <a:spcBef>
+                <a:spcPts val="0"/>
+              </a:spcBef>
+              <a:buClr>
+                <a:schemeClr val="accent5">
+                  <a:lumMod val="40000"/>
+                  <a:lumOff val="60000"/>
+                </a:schemeClr>
+              </a:buClr>
+              <a:buSzPct val="70000"/>
+            </a:pPr>
+            <a:r>
+              <a:rPr lang="en-US" sz="1400" b="1" noProof="1">
+                <a:solidFill>
+                  <a:schemeClr val="accent5">
+                    <a:lumMod val="20000"/>
+                    <a:lumOff val="80000"/>
+                  </a:schemeClr>
+                </a:solidFill>
+                <a:effectLst>
+                  <a:outerShdw blurRad="38100" dist="38100" dir="2700000" algn="tl">
+                    <a:srgbClr val="000000">
+                      <a:alpha val="43137"/>
+                    </a:srgbClr>
+                  </a:outerShdw>
+                </a:effectLst>
+                <a:latin typeface="Consolas" pitchFamily="49" charset="0"/>
+              </a:rPr>
+              <a:t> </a:t>
+            </a:r>
+            <a:r>
+              <a:rPr lang="en-US" sz="1400" b="1" noProof="1" smtClean="0">
+                <a:solidFill>
+                  <a:schemeClr val="accent5">
+                    <a:lumMod val="20000"/>
+                    <a:lumOff val="80000"/>
+                  </a:schemeClr>
+                </a:solidFill>
+                <a:effectLst>
+                  <a:outerShdw blurRad="38100" dist="38100" dir="2700000" algn="tl">
+                    <a:srgbClr val="000000">
+                      <a:alpha val="43137"/>
+                    </a:srgbClr>
+                  </a:outerShdw>
+                </a:effectLst>
+                <a:latin typeface="Consolas" pitchFamily="49" charset="0"/>
+              </a:rPr>
               <a:t>   …</a:t>
             </a:r>
-            <a:endParaRPr lang="en-US" sz="1500" b="1" noProof="1">
+            <a:endParaRPr lang="en-US" sz="1400" b="1" noProof="1">
               <a:solidFill>
                 <a:schemeClr val="accent5">
                   <a:lumMod val="20000"/>
@@ -10362,7 +10552,7 @@
               <a:buSzPct val="70000"/>
             </a:pPr>
             <a:r>
-              <a:rPr lang="en-US" sz="1500" b="1" noProof="1" smtClean="0">
+              <a:rPr lang="en-US" sz="1400" b="1" noProof="1" smtClean="0">
                 <a:solidFill>
                   <a:schemeClr val="accent5">
                     <a:lumMod val="20000"/>
@@ -10381,7 +10571,7 @@
               <a:t>  &lt;/</a:t>
             </a:r>
             <a:r>
-              <a:rPr lang="en-US" sz="1500" b="1" noProof="1">
+              <a:rPr lang="en-US" sz="1400" b="1" noProof="1">
                 <a:solidFill>
                   <a:schemeClr val="accent5">
                     <a:lumMod val="20000"/>
@@ -10414,7 +10604,7 @@
               <a:buSzPct val="70000"/>
             </a:pPr>
             <a:r>
-              <a:rPr lang="en-US" sz="1500" b="1" noProof="1">
+              <a:rPr lang="en-US" sz="1400" b="1" noProof="1" smtClean="0">
                 <a:solidFill>
                   <a:schemeClr val="accent5">
                     <a:lumMod val="20000"/>
@@ -10430,7 +10620,83 @@
                 </a:effectLst>
                 <a:latin typeface="Consolas" pitchFamily="49" charset="0"/>
               </a:rPr>
-              <a:t>  &lt;entityFramework&gt;</a:t>
+              <a:t>  &lt;</a:t>
+            </a:r>
+            <a:r>
+              <a:rPr lang="en-US" sz="1400" b="1" noProof="1">
+                <a:solidFill>
+                  <a:schemeClr val="accent5">
+                    <a:lumMod val="20000"/>
+                    <a:lumOff val="80000"/>
+                  </a:schemeClr>
+                </a:solidFill>
+                <a:effectLst>
+                  <a:outerShdw blurRad="38100" dist="38100" dir="2700000" algn="tl">
+                    <a:srgbClr val="000000">
+                      <a:alpha val="43137"/>
+                    </a:srgbClr>
+                  </a:outerShdw>
+                </a:effectLst>
+                <a:latin typeface="Consolas" pitchFamily="49" charset="0"/>
+              </a:rPr>
+              <a:t>system.webServer</a:t>
+            </a:r>
+            <a:r>
+              <a:rPr lang="en-US" sz="1400" b="1" noProof="1" smtClean="0">
+                <a:solidFill>
+                  <a:schemeClr val="accent5">
+                    <a:lumMod val="20000"/>
+                    <a:lumOff val="80000"/>
+                  </a:schemeClr>
+                </a:solidFill>
+                <a:effectLst>
+                  <a:outerShdw blurRad="38100" dist="38100" dir="2700000" algn="tl">
+                    <a:srgbClr val="000000">
+                      <a:alpha val="43137"/>
+                    </a:srgbClr>
+                  </a:outerShdw>
+                </a:effectLst>
+                <a:latin typeface="Consolas" pitchFamily="49" charset="0"/>
+              </a:rPr>
+              <a:t>&gt;</a:t>
+            </a:r>
+            <a:r>
+              <a:rPr lang="en-US" sz="1400" b="1" noProof="1">
+                <a:solidFill>
+                  <a:schemeClr val="accent5">
+                    <a:lumMod val="20000"/>
+                    <a:lumOff val="80000"/>
+                  </a:schemeClr>
+                </a:solidFill>
+                <a:effectLst>
+                  <a:outerShdw blurRad="38100" dist="38100" dir="2700000" algn="tl">
+                    <a:srgbClr val="000000">
+                      <a:alpha val="43137"/>
+                    </a:srgbClr>
+                  </a:outerShdw>
+                </a:effectLst>
+                <a:latin typeface="Consolas" pitchFamily="49" charset="0"/>
+              </a:rPr>
+              <a:t> … </a:t>
+            </a:r>
+            <a:r>
+              <a:rPr lang="en-US" sz="1400" b="1" noProof="1" smtClean="0">
+                <a:solidFill>
+                  <a:schemeClr val="accent5">
+                    <a:lumMod val="20000"/>
+                    <a:lumOff val="80000"/>
+                  </a:schemeClr>
+                </a:solidFill>
+                <a:effectLst>
+                  <a:outerShdw blurRad="38100" dist="38100" dir="2700000" algn="tl">
+                    <a:srgbClr val="000000">
+                      <a:alpha val="43137"/>
+                    </a:srgbClr>
+                  </a:outerShdw>
+                </a:effectLst>
+                <a:latin typeface="Consolas" pitchFamily="49" charset="0"/>
+              </a:rPr>
+              <a:t>&lt;/system.webServer&gt;</a:t>
             </a:r>
           </a:p>
           <a:p>
@@ -10447,7 +10713,7 @@
               <a:buSzPct val="70000"/>
             </a:pPr>
             <a:r>
-              <a:rPr lang="en-US" sz="1500" b="1" noProof="1" smtClean="0">
+              <a:rPr lang="en-US" sz="1400" b="1" noProof="1" smtClean="0">
                 <a:solidFill>
                   <a:schemeClr val="accent5">
                     <a:lumMod val="20000"/>
@@ -10463,8 +10729,119 @@
                 </a:effectLst>
                 <a:latin typeface="Consolas" pitchFamily="49" charset="0"/>
               </a:rPr>
-              <a:t>    …</a:t>
-            </a:r>
+              <a:t>  &lt;</a:t>
+            </a:r>
+            <a:r>
+              <a:rPr lang="en-US" sz="1400" b="1" noProof="1">
+                <a:solidFill>
+                  <a:schemeClr val="accent5">
+                    <a:lumMod val="20000"/>
+                    <a:lumOff val="80000"/>
+                  </a:schemeClr>
+                </a:solidFill>
+                <a:effectLst>
+                  <a:outerShdw blurRad="38100" dist="38100" dir="2700000" algn="tl">
+                    <a:srgbClr val="000000">
+                      <a:alpha val="43137"/>
+                    </a:srgbClr>
+                  </a:outerShdw>
+                </a:effectLst>
+                <a:latin typeface="Consolas" pitchFamily="49" charset="0"/>
+              </a:rPr>
+              <a:t>runtime</a:t>
+            </a:r>
+            <a:r>
+              <a:rPr lang="en-US" sz="1400" b="1" noProof="1" smtClean="0">
+                <a:solidFill>
+                  <a:schemeClr val="accent5">
+                    <a:lumMod val="20000"/>
+                    <a:lumOff val="80000"/>
+                  </a:schemeClr>
+                </a:solidFill>
+                <a:effectLst>
+                  <a:outerShdw blurRad="38100" dist="38100" dir="2700000" algn="tl">
+                    <a:srgbClr val="000000">
+                      <a:alpha val="43137"/>
+                    </a:srgbClr>
+                  </a:outerShdw>
+                </a:effectLst>
+                <a:latin typeface="Consolas" pitchFamily="49" charset="0"/>
+              </a:rPr>
+              <a:t>&gt;</a:t>
+            </a:r>
+            <a:r>
+              <a:rPr lang="en-US" sz="1400" b="1" noProof="1">
+                <a:solidFill>
+                  <a:schemeClr val="accent5">
+                    <a:lumMod val="20000"/>
+                    <a:lumOff val="80000"/>
+                  </a:schemeClr>
+                </a:solidFill>
+                <a:effectLst>
+                  <a:outerShdw blurRad="38100" dist="38100" dir="2700000" algn="tl">
+                    <a:srgbClr val="000000">
+                      <a:alpha val="43137"/>
+                    </a:srgbClr>
+                  </a:outerShdw>
+                </a:effectLst>
+                <a:latin typeface="Consolas" pitchFamily="49" charset="0"/>
+              </a:rPr>
+              <a:t> </a:t>
+            </a:r>
+            <a:r>
+              <a:rPr lang="en-US" sz="1400" b="1" noProof="1">
+                <a:solidFill>
+                  <a:schemeClr val="accent5">
+                    <a:lumMod val="20000"/>
+                    <a:lumOff val="80000"/>
+                  </a:schemeClr>
+                </a:solidFill>
+                <a:effectLst>
+                  <a:outerShdw blurRad="38100" dist="38100" dir="2700000" algn="tl">
+                    <a:srgbClr val="000000">
+                      <a:alpha val="43137"/>
+                    </a:srgbClr>
+                  </a:outerShdw>
+                </a:effectLst>
+                <a:latin typeface="Consolas" pitchFamily="49" charset="0"/>
+              </a:rPr>
+              <a:t>… </a:t>
+            </a:r>
+            <a:r>
+              <a:rPr lang="en-US" sz="1400" b="1" noProof="1" smtClean="0">
+                <a:solidFill>
+                  <a:schemeClr val="accent5">
+                    <a:lumMod val="20000"/>
+                    <a:lumOff val="80000"/>
+                  </a:schemeClr>
+                </a:solidFill>
+                <a:effectLst>
+                  <a:outerShdw blurRad="38100" dist="38100" dir="2700000" algn="tl">
+                    <a:srgbClr val="000000">
+                      <a:alpha val="43137"/>
+                    </a:srgbClr>
+                  </a:outerShdw>
+                </a:effectLst>
+                <a:latin typeface="Consolas" pitchFamily="49" charset="0"/>
+              </a:rPr>
+              <a:t>&lt;/runtime&gt;</a:t>
+            </a:r>
+            <a:endParaRPr lang="en-US" sz="1400" b="1" noProof="1">
+              <a:solidFill>
+                <a:schemeClr val="accent5">
+                  <a:lumMod val="20000"/>
+                  <a:lumOff val="80000"/>
+                </a:schemeClr>
+              </a:solidFill>
+              <a:effectLst>
+                <a:outerShdw blurRad="38100" dist="38100" dir="2700000" algn="tl">
+                  <a:srgbClr val="000000">
+                    <a:alpha val="43137"/>
+                  </a:srgbClr>
+                </a:outerShdw>
+              </a:effectLst>
+              <a:latin typeface="Consolas" pitchFamily="49" charset="0"/>
+            </a:endParaRPr>
           </a:p>
           <a:p>
             <a:pPr eaLnBrk="0" hangingPunct="0">
@@ -10480,7 +10857,7 @@
               <a:buSzPct val="70000"/>
             </a:pPr>
             <a:r>
-              <a:rPr lang="en-US" sz="1500" b="1" noProof="1" smtClean="0">
+              <a:rPr lang="en-US" sz="1400" b="1" noProof="1" smtClean="0">
                 <a:solidFill>
                   <a:schemeClr val="accent5">
                     <a:lumMod val="20000"/>
@@ -10499,7 +10876,7 @@
               <a:t>  </a:t>
             </a:r>
             <a:r>
-              <a:rPr lang="en-US" sz="1500" b="1" noProof="1">
+              <a:rPr lang="en-US" sz="1400" b="1" noProof="1">
                 <a:solidFill>
                   <a:schemeClr val="accent5">
                     <a:lumMod val="20000"/>
@@ -10515,7 +10892,64 @@
                 </a:effectLst>
                 <a:latin typeface="Consolas" pitchFamily="49" charset="0"/>
               </a:rPr>
-              <a:t>&lt;/entityFramework&gt;</a:t>
+              <a:t>&lt;entityFramework</a:t>
+            </a:r>
+            <a:r>
+              <a:rPr lang="en-US" sz="1400" b="1" noProof="1" smtClean="0">
+                <a:solidFill>
+                  <a:schemeClr val="accent5">
+                    <a:lumMod val="20000"/>
+                    <a:lumOff val="80000"/>
+                  </a:schemeClr>
+                </a:solidFill>
+                <a:effectLst>
+                  <a:outerShdw blurRad="38100" dist="38100" dir="2700000" algn="tl">
+                    <a:srgbClr val="000000">
+                      <a:alpha val="43137"/>
+                    </a:srgbClr>
+                  </a:outerShdw>
+                </a:effectLst>
+                <a:latin typeface="Consolas" pitchFamily="49" charset="0"/>
+              </a:rPr>
+              <a:t>&gt; … &lt;/</a:t>
+            </a:r>
+            <a:r>
+              <a:rPr lang="en-US" sz="1400" b="1" noProof="1">
+                <a:solidFill>
+                  <a:schemeClr val="accent5">
+                    <a:lumMod val="20000"/>
+                    <a:lumOff val="80000"/>
+                  </a:schemeClr>
+                </a:solidFill>
+                <a:effectLst>
+                  <a:outerShdw blurRad="38100" dist="38100" dir="2700000" algn="tl">
+                    <a:srgbClr val="000000">
+                      <a:alpha val="43137"/>
+                    </a:srgbClr>
+                  </a:outerShdw>
+                </a:effectLst>
+                <a:latin typeface="Consolas" pitchFamily="49" charset="0"/>
+              </a:rPr>
+              <a:t>entityFramework</a:t>
+            </a:r>
+            <a:r>
+              <a:rPr lang="en-US" sz="1400" b="1" noProof="1" smtClean="0">
+                <a:solidFill>
+                  <a:schemeClr val="accent5">
+                    <a:lumMod val="20000"/>
+                    <a:lumOff val="80000"/>
+                  </a:schemeClr>
+                </a:solidFill>
+                <a:effectLst>
+                  <a:outerShdw blurRad="38100" dist="38100" dir="2700000" algn="tl">
+                    <a:srgbClr val="000000">
+                      <a:alpha val="43137"/>
+                    </a:srgbClr>
+                  </a:outerShdw>
+                </a:effectLst>
+                <a:latin typeface="Consolas" pitchFamily="49" charset="0"/>
+              </a:rPr>
+              <a:t>&gt;</a:t>
             </a:r>
           </a:p>
           <a:p>
@@ -10532,7 +10966,7 @@
               <a:buSzPct val="70000"/>
             </a:pPr>
             <a:r>
-              <a:rPr lang="en-US" sz="1500" b="1" noProof="1">
+              <a:rPr lang="en-US" sz="1400" b="1" noProof="1" smtClean="0">
                 <a:solidFill>
                   <a:schemeClr val="accent5">
                     <a:lumMod val="20000"/>
@@ -10548,22 +10982,46 @@
                 </a:effectLst>
                 <a:latin typeface="Consolas" pitchFamily="49" charset="0"/>
               </a:rPr>
-              <a:t>&lt;/configuration&gt;</a:t>
-            </a:r>
-            <a:endParaRPr lang="en-US" sz="1500" b="1" noProof="1">
-              <a:solidFill>
-                <a:srgbClr val="8CF4F2"/>
-              </a:solidFill>
-              <a:effectLst>
-                <a:outerShdw blurRad="38100" dist="38100" dir="2700000" algn="tl">
-                  <a:srgbClr val="000000">
-                    <a:alpha val="43137"/>
-                  </a:srgbClr>
-                </a:outerShdw>
-              </a:effectLst>
-              <a:latin typeface="Consolas" pitchFamily="49" charset="0"/>
-              <a:cs typeface="Consolas" pitchFamily="49" charset="0"/>
-            </a:endParaRPr>
+              <a:t>&lt;/</a:t>
+            </a:r>
+            <a:r>
+              <a:rPr lang="en-US" sz="1400" b="1" noProof="1">
+                <a:solidFill>
+                  <a:schemeClr val="accent5">
+                    <a:lumMod val="20000"/>
+                    <a:lumOff val="80000"/>
+                  </a:schemeClr>
+                </a:solidFill>
+                <a:effectLst>
+                  <a:outerShdw blurRad="38100" dist="38100" dir="2700000" algn="tl">
+                    <a:srgbClr val="000000">
+                      <a:alpha val="43137"/>
+                    </a:srgbClr>
+                  </a:outerShdw>
+                </a:effectLst>
+                <a:latin typeface="Consolas" pitchFamily="49" charset="0"/>
+              </a:rPr>
+              <a:t>configuration</a:t>
+            </a:r>
+            <a:r>
+              <a:rPr lang="en-US" sz="1400" b="1" noProof="1" smtClean="0">
+                <a:solidFill>
+                  <a:schemeClr val="accent5">
+                    <a:lumMod val="20000"/>
+                    <a:lumOff val="80000"/>
+                  </a:schemeClr>
+                </a:solidFill>
+                <a:effectLst>
+                  <a:outerShdw blurRad="38100" dist="38100" dir="2700000" algn="tl">
+                    <a:srgbClr val="000000">
+                      <a:alpha val="43137"/>
+                    </a:srgbClr>
+                  </a:outerShdw>
+                </a:effectLst>
+                <a:latin typeface="Consolas" pitchFamily="49" charset="0"/>
+              </a:rPr>
+              <a:t>&gt;</a:t>
+            </a:r>
           </a:p>
         </p:txBody>
       </p:sp>
@@ -11136,6 +11594,10 @@
             <a:r>
               <a:rPr lang="en-US" dirty="0" err="1" smtClean="0"/>
               <a:t>vNext</a:t>
+            </a:r>
+            <a:r>
+              <a:rPr lang="en-US" dirty="0" smtClean="0"/>
+              <a:t> (5.0)</a:t>
             </a:r>
             <a:endParaRPr lang="en-US" dirty="0" smtClean="0"/>
           </a:p>
@@ -12569,50 +13031,105 @@
           </a:p>
         </p:txBody>
       </p:sp>
-      <p:pic>
-        <p:nvPicPr>
-          <p:cNvPr id="4098" name="Picture 2" descr="http://www.codeproject.com/KB/aspnet/ASPDOTNETPageLifecycle/3.jpg"/>
-          <p:cNvPicPr>
-            <a:picLocks noChangeAspect="1" noChangeArrowheads="1"/>
-          </p:cNvPicPr>
+      <p:grpSp>
+        <p:nvGrpSpPr>
+          <p:cNvPr id="5" name="Group 4"/>
+          <p:cNvGrpSpPr/>
           <p:nvPr/>
-        </p:nvPicPr>
-        <p:blipFill>
-          <a:blip r:embed="rId3">
-            <a:extLst>
-              <a:ext uri="{28A0092B-C50C-407E-A947-70E740481C1C}">
-                <a14:useLocalDpi xmlns:a14="http://schemas.microsoft.com/office/drawing/2010/main" val="0"/>
-              </a:ext>
-            </a:extLst>
-          </a:blip>
-          <a:srcRect/>
-          <a:stretch>
-            <a:fillRect/>
-          </a:stretch>
-        </p:blipFill>
-        <p:spPr bwMode="auto">
+        </p:nvGrpSpPr>
+        <p:grpSpPr>
           <a:xfrm>
             <a:off x="457200" y="1219200"/>
             <a:ext cx="8229600" cy="4835546"/>
+            <a:chOff x="457200" y="1219200"/>
+            <a:chExt cx="8229600" cy="4835546"/>
           </a:xfrm>
-          <a:prstGeom prst="rect">
-            <a:avLst/>
-          </a:prstGeom>
-          <a:noFill/>
-          <a:effectLst>
-            <a:softEdge rad="31750"/>
-          </a:effectLst>
-          <a:extLst>
-            <a:ext uri="{909E8E84-426E-40DD-AFC4-6F175D3DCCD1}">
-              <a14:hiddenFill xmlns:a14="http://schemas.microsoft.com/office/drawing/2010/main">
-                <a:solidFill>
-                  <a:srgbClr val="FFFFFF"/>
-                </a:solidFill>
-              </a14:hiddenFill>
-            </a:ext>
-          </a:extLst>
-        </p:spPr>
-      </p:pic>
+        </p:grpSpPr>
+        <p:pic>
+          <p:nvPicPr>
+            <p:cNvPr id="4098" name="Picture 2" descr="http://www.codeproject.com/KB/aspnet/ASPDOTNETPageLifecycle/3.jpg"/>
+            <p:cNvPicPr>
+              <a:picLocks noChangeAspect="1" noChangeArrowheads="1"/>
+            </p:cNvPicPr>
+            <p:nvPr/>
+          </p:nvPicPr>
+          <p:blipFill>
+            <a:blip r:embed="rId3">
+              <a:extLst>
+                <a:ext uri="{28A0092B-C50C-407E-A947-70E740481C1C}">
+                  <a14:useLocalDpi xmlns:a14="http://schemas.microsoft.com/office/drawing/2010/main" val="0"/>
+                </a:ext>
+              </a:extLst>
+            </a:blip>
+            <a:srcRect/>
+            <a:stretch>
+              <a:fillRect/>
+            </a:stretch>
+          </p:blipFill>
+          <p:spPr bwMode="auto">
+            <a:xfrm>
+              <a:off x="457200" y="1219200"/>
+              <a:ext cx="8229600" cy="4835546"/>
+            </a:xfrm>
+            <a:prstGeom prst="rect">
+              <a:avLst/>
+            </a:prstGeom>
+            <a:noFill/>
+            <a:effectLst>
+              <a:softEdge rad="31750"/>
+            </a:effectLst>
+            <a:extLst>
+              <a:ext uri="{909E8E84-426E-40DD-AFC4-6F175D3DCCD1}">
+                <a14:hiddenFill xmlns:a14="http://schemas.microsoft.com/office/drawing/2010/main">
+                  <a:solidFill>
+                    <a:srgbClr val="FFFFFF"/>
+                  </a:solidFill>
+                </a14:hiddenFill>
+              </a:ext>
+            </a:extLst>
+          </p:spPr>
+        </p:pic>
+        <p:sp>
+          <p:nvSpPr>
+            <p:cNvPr id="3" name="TextBox 2"/>
+            <p:cNvSpPr txBox="1"/>
+            <p:nvPr/>
+          </p:nvSpPr>
+          <p:spPr>
+            <a:xfrm>
+              <a:off x="533400" y="3429000"/>
+              <a:ext cx="1524000" cy="707886"/>
+            </a:xfrm>
+            <a:prstGeom prst="rect">
+              <a:avLst/>
+            </a:prstGeom>
+            <a:noFill/>
+          </p:spPr>
+          <p:txBody>
+            <a:bodyPr wrap="square" rtlCol="0">
+              <a:spAutoFit/>
+            </a:bodyPr>
+            <a:lstStyle/>
+            <a:p>
+              <a:r>
+                <a:rPr lang="en-US" sz="2000" dirty="0" smtClean="0">
+                  <a:solidFill>
+                    <a:srgbClr val="323232"/>
+                  </a:solidFill>
+                  <a:latin typeface="Comic Sans MS" panose="030F0702030302020204" pitchFamily="66" charset="0"/>
+                </a:rPr>
+                <a:t>Application Pools</a:t>
+              </a:r>
+              <a:endParaRPr lang="en-US" sz="2000" dirty="0">
+                <a:solidFill>
+                  <a:srgbClr val="323232"/>
+                </a:solidFill>
+                <a:latin typeface="Comic Sans MS" panose="030F0702030302020204" pitchFamily="66" charset="0"/>
+              </a:endParaRPr>
+            </a:p>
+          </p:txBody>
+        </p:sp>
+      </p:grpSp>
     </p:spTree>
     <p:extLst>
       <p:ext uri="{BB962C8B-B14F-4D97-AF65-F5344CB8AC3E}">
@@ -16873,7 +17390,7 @@
 </file>
 
 <file path=ppt/slides/slide36.xml><?xml version="1.0" encoding="utf-8"?>
-<p:sld xmlns:a="http://schemas.openxmlformats.org/drawingml/2006/main" xmlns:r="http://schemas.openxmlformats.org/officeDocument/2006/relationships" xmlns:p="http://schemas.openxmlformats.org/presentationml/2006/main">
+<p:sld xmlns:a="http://schemas.openxmlformats.org/drawingml/2006/main" xmlns:r="http://schemas.openxmlformats.org/officeDocument/2006/relationships" xmlns:p="http://schemas.openxmlformats.org/presentationml/2006/main" show="0">
   <p:cSld>
     <p:spTree>
       <p:nvGrpSpPr>
@@ -17186,10 +17703,154 @@
   <p:clrMapOvr>
     <a:masterClrMapping/>
   </p:clrMapOvr>
+  <mc:AlternateContent xmlns:mc="http://schemas.openxmlformats.org/markup-compatibility/2006">
+    <mc:Choice xmlns:p14="http://schemas.microsoft.com/office/powerpoint/2010/main" Requires="p14">
+      <p:transition spd="slow" p14:dur="2000"/>
+    </mc:Choice>
+    <mc:Fallback>
+      <p:transition spd="slow"/>
+    </mc:Fallback>
+  </mc:AlternateContent>
 </p:sld>
 </file>
 
 <file path=ppt/slides/slide37.xml><?xml version="1.0" encoding="utf-8"?>
+<p:sld xmlns:a="http://schemas.openxmlformats.org/drawingml/2006/main" xmlns:r="http://schemas.openxmlformats.org/officeDocument/2006/relationships" xmlns:p="http://schemas.openxmlformats.org/presentationml/2006/main">
+  <p:cSld>
+    <p:spTree>
+      <p:nvGrpSpPr>
+        <p:cNvPr id="1" name=""/>
+        <p:cNvGrpSpPr/>
+        <p:nvPr/>
+      </p:nvGrpSpPr>
+      <p:grpSpPr>
+        <a:xfrm>
+          <a:off x="0" y="0"/>
+          <a:ext cx="0" cy="0"/>
+          <a:chOff x="0" y="0"/>
+          <a:chExt cx="0" cy="0"/>
+        </a:xfrm>
+      </p:grpSpPr>
+      <p:sp>
+        <p:nvSpPr>
+          <p:cNvPr id="2" name="Title 1"/>
+          <p:cNvSpPr>
+            <a:spLocks noGrp="1"/>
+          </p:cNvSpPr>
+          <p:nvPr>
+            <p:ph type="title"/>
+          </p:nvPr>
+        </p:nvSpPr>
+        <p:spPr>
+          <a:xfrm>
+            <a:off x="1828800" y="0"/>
+            <a:ext cx="7086600" cy="838200"/>
+          </a:xfrm>
+        </p:spPr>
+        <p:txBody>
+          <a:bodyPr/>
+          <a:lstStyle/>
+          <a:p>
+            <a:r>
+              <a:rPr lang="en-US" dirty="0" smtClean="0"/>
+              <a:t>ASP.NET </a:t>
+            </a:r>
+            <a:r>
+              <a:rPr lang="en-US" dirty="0" err="1" smtClean="0"/>
+              <a:t>vNext</a:t>
+            </a:r>
+            <a:r>
+              <a:rPr lang="en-US" dirty="0" smtClean="0"/>
+              <a:t> (5.0)</a:t>
+            </a:r>
+            <a:endParaRPr lang="en-US" dirty="0"/>
+          </a:p>
+        </p:txBody>
+      </p:sp>
+      <p:sp>
+        <p:nvSpPr>
+          <p:cNvPr id="4" name="Slide Number Placeholder 3"/>
+          <p:cNvSpPr>
+            <a:spLocks noGrp="1"/>
+          </p:cNvSpPr>
+          <p:nvPr>
+            <p:ph type="sldNum" sz="quarter" idx="10"/>
+          </p:nvPr>
+        </p:nvSpPr>
+        <p:spPr/>
+        <p:txBody>
+          <a:bodyPr/>
+          <a:lstStyle/>
+          <a:p>
+            <a:pPr>
+              <a:defRPr/>
+            </a:pPr>
+            <a:fld id="{58452FF4-89E3-4D1B-9927-2DBDC00E58D7}" type="slidenum">
+              <a:rPr lang="en-US" smtClean="0"/>
+              <a:pPr>
+                <a:defRPr/>
+              </a:pPr>
+              <a:t>37</a:t>
+            </a:fld>
+            <a:endParaRPr lang="en-US" dirty="0"/>
+          </a:p>
+        </p:txBody>
+      </p:sp>
+      <p:pic>
+        <p:nvPicPr>
+          <p:cNvPr id="5" name="Picture 4"/>
+          <p:cNvPicPr>
+            <a:picLocks noChangeAspect="1"/>
+          </p:cNvPicPr>
+          <p:nvPr/>
+        </p:nvPicPr>
+        <p:blipFill>
+          <a:blip r:embed="rId2"/>
+          <a:stretch>
+            <a:fillRect/>
+          </a:stretch>
+        </p:blipFill>
+        <p:spPr>
+          <a:xfrm>
+            <a:off x="533400" y="723900"/>
+            <a:ext cx="7975600" cy="5981700"/>
+          </a:xfrm>
+          <a:prstGeom prst="rect">
+            <a:avLst/>
+          </a:prstGeom>
+          <a:ln>
+            <a:noFill/>
+          </a:ln>
+          <a:effectLst>
+            <a:outerShdw blurRad="292100" dist="139700" dir="2700000" algn="tl" rotWithShape="0">
+              <a:srgbClr val="333333">
+                <a:alpha val="65000"/>
+              </a:srgbClr>
+            </a:outerShdw>
+          </a:effectLst>
+        </p:spPr>
+      </p:pic>
+    </p:spTree>
+    <p:extLst>
+      <p:ext uri="{BB962C8B-B14F-4D97-AF65-F5344CB8AC3E}">
+        <p14:creationId xmlns:p14="http://schemas.microsoft.com/office/powerpoint/2010/main" val="2361952037"/>
+      </p:ext>
+    </p:extLst>
+  </p:cSld>
+  <p:clrMapOvr>
+    <a:masterClrMapping/>
+  </p:clrMapOvr>
+  <p:timing>
+    <p:tnLst>
+      <p:par>
+        <p:cTn id="1" dur="indefinite" restart="never" nodeType="tmRoot"/>
+      </p:par>
+    </p:tnLst>
+  </p:timing>
+</p:sld>
+</file>
+
+<file path=ppt/slides/slide38.xml><?xml version="1.0" encoding="utf-8"?>
 <p:sld xmlns:a="http://schemas.openxmlformats.org/drawingml/2006/main" xmlns:r="http://schemas.openxmlformats.org/officeDocument/2006/relationships" xmlns:p="http://schemas.openxmlformats.org/presentationml/2006/main">
   <p:cSld>
     <p:spTree>
@@ -17228,11 +17889,7 @@
           <a:p>
             <a:r>
               <a:rPr lang="en-US" dirty="0"/>
-              <a:t>ASP.NET </a:t>
-            </a:r>
-            <a:r>
-              <a:rPr lang="en-US" dirty="0" smtClean="0"/>
-              <a:t>Introduction</a:t>
+              <a:t>Introduction to ASP.NET</a:t>
             </a:r>
             <a:endParaRPr lang="en-US" dirty="0"/>
           </a:p>
@@ -17285,10 +17942,17 @@
   <p:clrMapOvr>
     <a:masterClrMapping/>
   </p:clrMapOvr>
+  <p:timing>
+    <p:tnLst>
+      <p:par>
+        <p:cTn id="1" dur="indefinite" restart="never" nodeType="tmRoot"/>
+      </p:par>
+    </p:tnLst>
+  </p:timing>
 </p:sld>
 </file>
 
-<file path=ppt/slides/slide38.xml><?xml version="1.0" encoding="utf-8"?>
+<file path=ppt/slides/slide39.xml><?xml version="1.0" encoding="utf-8"?>
 <p:sld xmlns:a="http://schemas.openxmlformats.org/drawingml/2006/main" xmlns:r="http://schemas.openxmlformats.org/officeDocument/2006/relationships" xmlns:p="http://schemas.openxmlformats.org/presentationml/2006/main">
   <p:cSld>
     <p:spTree>
@@ -17749,243 +18413,6 @@
       </p:par>
     </p:tnLst>
   </p:timing>
-</p:sld>
-</file>
-
-<file path=ppt/slides/slide39.xml><?xml version="1.0" encoding="utf-8"?>
-<p:sld xmlns:a="http://schemas.openxmlformats.org/drawingml/2006/main" xmlns:r="http://schemas.openxmlformats.org/officeDocument/2006/relationships" xmlns:p="http://schemas.openxmlformats.org/presentationml/2006/main">
-  <p:cSld>
-    <p:spTree>
-      <p:nvGrpSpPr>
-        <p:cNvPr id="1" name=""/>
-        <p:cNvGrpSpPr/>
-        <p:nvPr/>
-      </p:nvGrpSpPr>
-      <p:grpSpPr>
-        <a:xfrm>
-          <a:off x="0" y="0"/>
-          <a:ext cx="0" cy="0"/>
-          <a:chOff x="0" y="0"/>
-          <a:chExt cx="0" cy="0"/>
-        </a:xfrm>
-      </p:grpSpPr>
-      <p:sp>
-        <p:nvSpPr>
-          <p:cNvPr id="2" name="Title 1"/>
-          <p:cNvSpPr>
-            <a:spLocks noGrp="1"/>
-          </p:cNvSpPr>
-          <p:nvPr>
-            <p:ph type="title"/>
-          </p:nvPr>
-        </p:nvSpPr>
-        <p:spPr/>
-        <p:txBody>
-          <a:bodyPr/>
-          <a:lstStyle/>
-          <a:p>
-            <a:r>
-              <a:rPr lang="en-US" dirty="0" smtClean="0"/>
-              <a:t>Exercises</a:t>
-            </a:r>
-            <a:endParaRPr lang="en-US" dirty="0"/>
-          </a:p>
-        </p:txBody>
-      </p:sp>
-      <p:sp>
-        <p:nvSpPr>
-          <p:cNvPr id="3" name="Content Placeholder 2"/>
-          <p:cNvSpPr>
-            <a:spLocks noGrp="1"/>
-          </p:cNvSpPr>
-          <p:nvPr>
-            <p:ph idx="1"/>
-          </p:nvPr>
-        </p:nvSpPr>
-        <p:spPr>
-          <a:xfrm>
-            <a:off x="228600" y="815622"/>
-            <a:ext cx="8686800" cy="5791200"/>
-          </a:xfrm>
-        </p:spPr>
-        <p:txBody>
-          <a:bodyPr/>
-          <a:lstStyle/>
-          <a:p>
-            <a:pPr marL="360363" indent="-360363">
-              <a:lnSpc>
-                <a:spcPct val="100000"/>
-              </a:lnSpc>
-              <a:buFont typeface="+mj-lt"/>
-              <a:buAutoNum type="arabicPeriod"/>
-              <a:tabLst/>
-            </a:pPr>
-            <a:r>
-              <a:rPr lang="en-US" sz="2800" dirty="0" smtClean="0"/>
-              <a:t>Create and run few Web applications in Visual Studio to play with ASP.NET, compile and run them:</a:t>
-            </a:r>
-          </a:p>
-          <a:p>
-            <a:pPr marL="804863" lvl="1" indent="-457200">
-              <a:lnSpc>
-                <a:spcPct val="100000"/>
-              </a:lnSpc>
-              <a:spcBef>
-                <a:spcPts val="300"/>
-              </a:spcBef>
-            </a:pPr>
-            <a:r>
-              <a:rPr lang="en-US" sz="2600" dirty="0" smtClean="0"/>
-              <a:t>ASP.NET Web Forms application</a:t>
-            </a:r>
-          </a:p>
-          <a:p>
-            <a:pPr marL="804863" lvl="1" indent="-457200">
-              <a:lnSpc>
-                <a:spcPct val="100000"/>
-              </a:lnSpc>
-              <a:spcBef>
-                <a:spcPts val="300"/>
-              </a:spcBef>
-            </a:pPr>
-            <a:r>
-              <a:rPr lang="en-US" sz="2600" dirty="0"/>
-              <a:t>ASP.NET </a:t>
-            </a:r>
-            <a:r>
-              <a:rPr lang="en-US" sz="2600" dirty="0" smtClean="0"/>
-              <a:t>MVC application</a:t>
-            </a:r>
-          </a:p>
-          <a:p>
-            <a:pPr marL="804863" lvl="1" indent="-457200">
-              <a:lnSpc>
-                <a:spcPct val="100000"/>
-              </a:lnSpc>
-              <a:spcBef>
-                <a:spcPts val="300"/>
-              </a:spcBef>
-            </a:pPr>
-            <a:r>
-              <a:rPr lang="en-US" sz="2600" dirty="0"/>
-              <a:t>ASP.NET Web </a:t>
-            </a:r>
-            <a:r>
-              <a:rPr lang="en-US" sz="2600" dirty="0" smtClean="0"/>
-              <a:t>API application</a:t>
-            </a:r>
-          </a:p>
-          <a:p>
-            <a:pPr marL="804863" lvl="1" indent="-457200">
-              <a:lnSpc>
-                <a:spcPct val="100000"/>
-              </a:lnSpc>
-              <a:spcBef>
-                <a:spcPts val="300"/>
-              </a:spcBef>
-            </a:pPr>
-            <a:r>
-              <a:rPr lang="en-US" sz="2600" dirty="0"/>
-              <a:t>ASP.NET </a:t>
-            </a:r>
-            <a:r>
-              <a:rPr lang="en-US" sz="2600" dirty="0" smtClean="0"/>
-              <a:t>Single Page application (SPA)</a:t>
-            </a:r>
-          </a:p>
-          <a:p>
-            <a:pPr marL="360363" indent="-360363">
-              <a:lnSpc>
-                <a:spcPct val="100000"/>
-              </a:lnSpc>
-              <a:buFont typeface="+mj-lt"/>
-              <a:buAutoNum type="arabicPeriod"/>
-            </a:pPr>
-            <a:r>
-              <a:rPr lang="en-US" sz="2800" dirty="0" smtClean="0"/>
-              <a:t>Write a simple application to sum numbers in ASP.NET Web Forms and ASP.NET MVC. Submit the code only (without the </a:t>
-            </a:r>
-            <a:r>
-              <a:rPr lang="en-US" sz="2800" dirty="0" err="1" smtClean="0"/>
-              <a:t>NuGet</a:t>
-            </a:r>
-            <a:r>
-              <a:rPr lang="en-US" sz="2800" dirty="0" smtClean="0"/>
-              <a:t> packages).</a:t>
-            </a:r>
-          </a:p>
-          <a:p>
-            <a:pPr marL="360363" indent="-360363">
-              <a:lnSpc>
-                <a:spcPct val="100000"/>
-              </a:lnSpc>
-              <a:buFont typeface="+mj-lt"/>
-              <a:buAutoNum type="arabicPeriod"/>
-            </a:pPr>
-            <a:r>
-              <a:rPr lang="en-US" sz="2800" dirty="0" smtClean="0"/>
-              <a:t>* Write an HTTP handler that accepts a text as HTTP GET or POST request and returns as a result the text as PNG image. Map it to process </a:t>
-            </a:r>
-            <a:r>
-              <a:rPr lang="en-US" sz="2800" noProof="1" smtClean="0">
-                <a:solidFill>
-                  <a:schemeClr val="accent5">
-                    <a:lumMod val="20000"/>
-                    <a:lumOff val="80000"/>
-                  </a:schemeClr>
-                </a:solidFill>
-                <a:latin typeface="Consolas" panose="020B0609020204030204" pitchFamily="49" charset="0"/>
-                <a:cs typeface="Consolas" panose="020B0609020204030204" pitchFamily="49" charset="0"/>
-              </a:rPr>
-              <a:t>*.img</a:t>
-            </a:r>
-            <a:r>
-              <a:rPr lang="en-US" sz="2800" dirty="0" smtClean="0"/>
-              <a:t> requests.</a:t>
-            </a:r>
-            <a:endParaRPr lang="en-US" sz="2800" dirty="0"/>
-          </a:p>
-        </p:txBody>
-      </p:sp>
-      <p:sp>
-        <p:nvSpPr>
-          <p:cNvPr id="4" name="Slide Number Placeholder 3"/>
-          <p:cNvSpPr>
-            <a:spLocks noGrp="1"/>
-          </p:cNvSpPr>
-          <p:nvPr>
-            <p:ph type="sldNum" sz="quarter" idx="10"/>
-          </p:nvPr>
-        </p:nvSpPr>
-        <p:spPr/>
-        <p:txBody>
-          <a:bodyPr/>
-          <a:lstStyle/>
-          <a:p>
-            <a:pPr>
-              <a:defRPr/>
-            </a:pPr>
-            <a:fld id="{58452FF4-89E3-4D1B-9927-2DBDC00E58D7}" type="slidenum">
-              <a:rPr lang="en-US" smtClean="0"/>
-              <a:pPr>
-                <a:defRPr/>
-              </a:pPr>
-              <a:t>39</a:t>
-            </a:fld>
-            <a:endParaRPr lang="en-US" dirty="0"/>
-          </a:p>
-        </p:txBody>
-      </p:sp>
-    </p:spTree>
-    <p:extLst>
-      <p:ext uri="{BB962C8B-B14F-4D97-AF65-F5344CB8AC3E}">
-        <p14:creationId xmlns:p14="http://schemas.microsoft.com/office/powerpoint/2010/main" val="1361208770"/>
-      </p:ext>
-    </p:extLst>
-  </p:cSld>
-  <p:clrMapOvr>
-    <a:masterClrMapping/>
-  </p:clrMapOvr>
 </p:sld>
 </file>
 
@@ -18470,6 +18897,243 @@
       </p:par>
     </p:tnLst>
   </p:timing>
+</p:sld>
+</file>
+
+<file path=ppt/slides/slide40.xml><?xml version="1.0" encoding="utf-8"?>
+<p:sld xmlns:a="http://schemas.openxmlformats.org/drawingml/2006/main" xmlns:r="http://schemas.openxmlformats.org/officeDocument/2006/relationships" xmlns:p="http://schemas.openxmlformats.org/presentationml/2006/main">
+  <p:cSld>
+    <p:spTree>
+      <p:nvGrpSpPr>
+        <p:cNvPr id="1" name=""/>
+        <p:cNvGrpSpPr/>
+        <p:nvPr/>
+      </p:nvGrpSpPr>
+      <p:grpSpPr>
+        <a:xfrm>
+          <a:off x="0" y="0"/>
+          <a:ext cx="0" cy="0"/>
+          <a:chOff x="0" y="0"/>
+          <a:chExt cx="0" cy="0"/>
+        </a:xfrm>
+      </p:grpSpPr>
+      <p:sp>
+        <p:nvSpPr>
+          <p:cNvPr id="2" name="Title 1"/>
+          <p:cNvSpPr>
+            <a:spLocks noGrp="1"/>
+          </p:cNvSpPr>
+          <p:nvPr>
+            <p:ph type="title"/>
+          </p:nvPr>
+        </p:nvSpPr>
+        <p:spPr/>
+        <p:txBody>
+          <a:bodyPr/>
+          <a:lstStyle/>
+          <a:p>
+            <a:r>
+              <a:rPr lang="en-US" dirty="0" smtClean="0"/>
+              <a:t>Exercises</a:t>
+            </a:r>
+            <a:endParaRPr lang="en-US" dirty="0"/>
+          </a:p>
+        </p:txBody>
+      </p:sp>
+      <p:sp>
+        <p:nvSpPr>
+          <p:cNvPr id="3" name="Content Placeholder 2"/>
+          <p:cNvSpPr>
+            <a:spLocks noGrp="1"/>
+          </p:cNvSpPr>
+          <p:nvPr>
+            <p:ph idx="1"/>
+          </p:nvPr>
+        </p:nvSpPr>
+        <p:spPr>
+          <a:xfrm>
+            <a:off x="228600" y="815622"/>
+            <a:ext cx="8686800" cy="5791200"/>
+          </a:xfrm>
+        </p:spPr>
+        <p:txBody>
+          <a:bodyPr/>
+          <a:lstStyle/>
+          <a:p>
+            <a:pPr marL="360363" indent="-360363">
+              <a:lnSpc>
+                <a:spcPct val="100000"/>
+              </a:lnSpc>
+              <a:buFont typeface="+mj-lt"/>
+              <a:buAutoNum type="arabicPeriod"/>
+              <a:tabLst/>
+            </a:pPr>
+            <a:r>
+              <a:rPr lang="en-US" sz="2800" dirty="0" smtClean="0"/>
+              <a:t>Create and run few Web applications in Visual Studio to play with ASP.NET, compile and run them:</a:t>
+            </a:r>
+          </a:p>
+          <a:p>
+            <a:pPr marL="804863" lvl="1" indent="-457200">
+              <a:lnSpc>
+                <a:spcPct val="100000"/>
+              </a:lnSpc>
+              <a:spcBef>
+                <a:spcPts val="300"/>
+              </a:spcBef>
+            </a:pPr>
+            <a:r>
+              <a:rPr lang="en-US" sz="2600" dirty="0" smtClean="0"/>
+              <a:t>ASP.NET Web Forms application</a:t>
+            </a:r>
+          </a:p>
+          <a:p>
+            <a:pPr marL="804863" lvl="1" indent="-457200">
+              <a:lnSpc>
+                <a:spcPct val="100000"/>
+              </a:lnSpc>
+              <a:spcBef>
+                <a:spcPts val="300"/>
+              </a:spcBef>
+            </a:pPr>
+            <a:r>
+              <a:rPr lang="en-US" sz="2600" dirty="0"/>
+              <a:t>ASP.NET </a:t>
+            </a:r>
+            <a:r>
+              <a:rPr lang="en-US" sz="2600" dirty="0" smtClean="0"/>
+              <a:t>MVC application</a:t>
+            </a:r>
+          </a:p>
+          <a:p>
+            <a:pPr marL="804863" lvl="1" indent="-457200">
+              <a:lnSpc>
+                <a:spcPct val="100000"/>
+              </a:lnSpc>
+              <a:spcBef>
+                <a:spcPts val="300"/>
+              </a:spcBef>
+            </a:pPr>
+            <a:r>
+              <a:rPr lang="en-US" sz="2600" dirty="0"/>
+              <a:t>ASP.NET Web </a:t>
+            </a:r>
+            <a:r>
+              <a:rPr lang="en-US" sz="2600" dirty="0" smtClean="0"/>
+              <a:t>API application</a:t>
+            </a:r>
+          </a:p>
+          <a:p>
+            <a:pPr marL="804863" lvl="1" indent="-457200">
+              <a:lnSpc>
+                <a:spcPct val="100000"/>
+              </a:lnSpc>
+              <a:spcBef>
+                <a:spcPts val="300"/>
+              </a:spcBef>
+            </a:pPr>
+            <a:r>
+              <a:rPr lang="en-US" sz="2600" dirty="0"/>
+              <a:t>ASP.NET </a:t>
+            </a:r>
+            <a:r>
+              <a:rPr lang="en-US" sz="2600" dirty="0" smtClean="0"/>
+              <a:t>Single Page application (SPA)</a:t>
+            </a:r>
+          </a:p>
+          <a:p>
+            <a:pPr marL="360363" indent="-360363">
+              <a:lnSpc>
+                <a:spcPct val="100000"/>
+              </a:lnSpc>
+              <a:buFont typeface="+mj-lt"/>
+              <a:buAutoNum type="arabicPeriod"/>
+            </a:pPr>
+            <a:r>
+              <a:rPr lang="en-US" sz="2800" dirty="0" smtClean="0"/>
+              <a:t>Write a simple application to sum numbers in ASP.NET Web Forms and ASP.NET MVC. Submit the code only (without the </a:t>
+            </a:r>
+            <a:r>
+              <a:rPr lang="en-US" sz="2800" dirty="0" err="1" smtClean="0"/>
+              <a:t>NuGet</a:t>
+            </a:r>
+            <a:r>
+              <a:rPr lang="en-US" sz="2800" dirty="0" smtClean="0"/>
+              <a:t> packages).</a:t>
+            </a:r>
+          </a:p>
+          <a:p>
+            <a:pPr marL="360363" indent="-360363">
+              <a:lnSpc>
+                <a:spcPct val="100000"/>
+              </a:lnSpc>
+              <a:buFont typeface="+mj-lt"/>
+              <a:buAutoNum type="arabicPeriod"/>
+            </a:pPr>
+            <a:r>
+              <a:rPr lang="en-US" sz="2800" dirty="0" smtClean="0"/>
+              <a:t>* Write an HTTP handler that accepts a text as HTTP GET or POST request and returns as a result the text as PNG image. Map it to process </a:t>
+            </a:r>
+            <a:r>
+              <a:rPr lang="en-US" sz="2800" noProof="1" smtClean="0">
+                <a:solidFill>
+                  <a:schemeClr val="accent5">
+                    <a:lumMod val="20000"/>
+                    <a:lumOff val="80000"/>
+                  </a:schemeClr>
+                </a:solidFill>
+                <a:latin typeface="Consolas" panose="020B0609020204030204" pitchFamily="49" charset="0"/>
+                <a:cs typeface="Consolas" panose="020B0609020204030204" pitchFamily="49" charset="0"/>
+              </a:rPr>
+              <a:t>*.img</a:t>
+            </a:r>
+            <a:r>
+              <a:rPr lang="en-US" sz="2800" dirty="0" smtClean="0"/>
+              <a:t> requests.</a:t>
+            </a:r>
+            <a:endParaRPr lang="en-US" sz="2800" dirty="0"/>
+          </a:p>
+        </p:txBody>
+      </p:sp>
+      <p:sp>
+        <p:nvSpPr>
+          <p:cNvPr id="4" name="Slide Number Placeholder 3"/>
+          <p:cNvSpPr>
+            <a:spLocks noGrp="1"/>
+          </p:cNvSpPr>
+          <p:nvPr>
+            <p:ph type="sldNum" sz="quarter" idx="10"/>
+          </p:nvPr>
+        </p:nvSpPr>
+        <p:spPr/>
+        <p:txBody>
+          <a:bodyPr/>
+          <a:lstStyle/>
+          <a:p>
+            <a:pPr>
+              <a:defRPr/>
+            </a:pPr>
+            <a:fld id="{58452FF4-89E3-4D1B-9927-2DBDC00E58D7}" type="slidenum">
+              <a:rPr lang="en-US" smtClean="0"/>
+              <a:pPr>
+                <a:defRPr/>
+              </a:pPr>
+              <a:t>40</a:t>
+            </a:fld>
+            <a:endParaRPr lang="en-US" dirty="0"/>
+          </a:p>
+        </p:txBody>
+      </p:sp>
+    </p:spTree>
+    <p:extLst>
+      <p:ext uri="{BB962C8B-B14F-4D97-AF65-F5344CB8AC3E}">
+        <p14:creationId xmlns:p14="http://schemas.microsoft.com/office/powerpoint/2010/main" val="1361208770"/>
+      </p:ext>
+    </p:extLst>
+  </p:cSld>
+  <p:clrMapOvr>
+    <a:masterClrMapping/>
+  </p:clrMapOvr>
 </p:sld>
 </file>
 

</xml_diff>